<commit_message>
Correção da aula sobre criação de menus
</commit_message>
<xml_diff>
--- a/Aula08-Criação de Menus/Aula08-Criação de Menus.pptx
+++ b/Aula08-Criação de Menus/Aula08-Criação de Menus.pptx
@@ -20,27 +20,27 @@
   <p:notesSz cx="6858000" cy="9144000"/>
   <p:embeddedFontLst>
     <p:embeddedFont>
-      <p:font typeface="Poppins Ultra-Bold" panose="020B0604020202020204" charset="0"/>
+      <p:font typeface="Lato Bold" panose="020B0604020202020204" charset="0"/>
       <p:regular r:id="rId12"/>
     </p:embeddedFont>
     <p:embeddedFont>
-      <p:font typeface="Lato" panose="020B0604020202020204" charset="0"/>
+      <p:font typeface="Poppins Ultra-Bold" panose="020B0604020202020204" charset="0"/>
       <p:regular r:id="rId13"/>
     </p:embeddedFont>
     <p:embeddedFont>
-      <p:font typeface="Lato Bold" panose="020B0604020202020204" charset="0"/>
+      <p:font typeface="Lato" panose="020B0604020202020204" charset="0"/>
       <p:regular r:id="rId14"/>
     </p:embeddedFont>
     <p:embeddedFont>
-      <p:font typeface="Calibri" panose="020F0502020204030204" pitchFamily="34" charset="0"/>
+      <p:font typeface="Poppins Bold" panose="020B0604020202020204" charset="0"/>
       <p:regular r:id="rId15"/>
-      <p:bold r:id="rId16"/>
-      <p:italic r:id="rId17"/>
-      <p:boldItalic r:id="rId18"/>
     </p:embeddedFont>
     <p:embeddedFont>
-      <p:font typeface="Poppins Bold" panose="020B0604020202020204" charset="0"/>
-      <p:regular r:id="rId19"/>
+      <p:font typeface="Calibri" panose="020F0502020204030204" pitchFamily="34" charset="0"/>
+      <p:regular r:id="rId16"/>
+      <p:bold r:id="rId17"/>
+      <p:italic r:id="rId18"/>
+      <p:boldItalic r:id="rId19"/>
     </p:embeddedFont>
   </p:embeddedFontLst>
   <p:defaultTextStyle>
@@ -337,7 +337,7 @@
             <a:fld id="{1D8BD707-D9CF-40AE-B4C6-C98DA3205C09}" type="datetimeFigureOut">
               <a:rPr lang="en-US" smtClean="0"/>
               <a:pPr/>
-              <a:t>3/8/2024</a:t>
+              <a:t>3/16/2024</a:t>
             </a:fld>
             <a:endParaRPr lang="en-US"/>
           </a:p>
@@ -502,7 +502,7 @@
             <a:fld id="{1D8BD707-D9CF-40AE-B4C6-C98DA3205C09}" type="datetimeFigureOut">
               <a:rPr lang="en-US" smtClean="0"/>
               <a:pPr/>
-              <a:t>3/8/2024</a:t>
+              <a:t>3/16/2024</a:t>
             </a:fld>
             <a:endParaRPr lang="en-US"/>
           </a:p>
@@ -677,7 +677,7 @@
             <a:fld id="{1D8BD707-D9CF-40AE-B4C6-C98DA3205C09}" type="datetimeFigureOut">
               <a:rPr lang="en-US" smtClean="0"/>
               <a:pPr/>
-              <a:t>3/8/2024</a:t>
+              <a:t>3/16/2024</a:t>
             </a:fld>
             <a:endParaRPr lang="en-US"/>
           </a:p>
@@ -842,7 +842,7 @@
             <a:fld id="{1D8BD707-D9CF-40AE-B4C6-C98DA3205C09}" type="datetimeFigureOut">
               <a:rPr lang="en-US" smtClean="0"/>
               <a:pPr/>
-              <a:t>3/8/2024</a:t>
+              <a:t>3/16/2024</a:t>
             </a:fld>
             <a:endParaRPr lang="en-US"/>
           </a:p>
@@ -1084,7 +1084,7 @@
             <a:fld id="{1D8BD707-D9CF-40AE-B4C6-C98DA3205C09}" type="datetimeFigureOut">
               <a:rPr lang="en-US" smtClean="0"/>
               <a:pPr/>
-              <a:t>3/8/2024</a:t>
+              <a:t>3/16/2024</a:t>
             </a:fld>
             <a:endParaRPr lang="en-US"/>
           </a:p>
@@ -1366,7 +1366,7 @@
             <a:fld id="{1D8BD707-D9CF-40AE-B4C6-C98DA3205C09}" type="datetimeFigureOut">
               <a:rPr lang="en-US" smtClean="0"/>
               <a:pPr/>
-              <a:t>3/8/2024</a:t>
+              <a:t>3/16/2024</a:t>
             </a:fld>
             <a:endParaRPr lang="en-US"/>
           </a:p>
@@ -1782,7 +1782,7 @@
             <a:fld id="{1D8BD707-D9CF-40AE-B4C6-C98DA3205C09}" type="datetimeFigureOut">
               <a:rPr lang="en-US" smtClean="0"/>
               <a:pPr/>
-              <a:t>3/8/2024</a:t>
+              <a:t>3/16/2024</a:t>
             </a:fld>
             <a:endParaRPr lang="en-US"/>
           </a:p>
@@ -1896,7 +1896,7 @@
             <a:fld id="{1D8BD707-D9CF-40AE-B4C6-C98DA3205C09}" type="datetimeFigureOut">
               <a:rPr lang="en-US" smtClean="0"/>
               <a:pPr/>
-              <a:t>3/8/2024</a:t>
+              <a:t>3/16/2024</a:t>
             </a:fld>
             <a:endParaRPr lang="en-US"/>
           </a:p>
@@ -1988,7 +1988,7 @@
             <a:fld id="{1D8BD707-D9CF-40AE-B4C6-C98DA3205C09}" type="datetimeFigureOut">
               <a:rPr lang="en-US" smtClean="0"/>
               <a:pPr/>
-              <a:t>3/8/2024</a:t>
+              <a:t>3/16/2024</a:t>
             </a:fld>
             <a:endParaRPr lang="en-US"/>
           </a:p>
@@ -2260,7 +2260,7 @@
             <a:fld id="{1D8BD707-D9CF-40AE-B4C6-C98DA3205C09}" type="datetimeFigureOut">
               <a:rPr lang="en-US" smtClean="0"/>
               <a:pPr/>
-              <a:t>3/8/2024</a:t>
+              <a:t>3/16/2024</a:t>
             </a:fld>
             <a:endParaRPr lang="en-US"/>
           </a:p>
@@ -2509,7 +2509,7 @@
             <a:fld id="{1D8BD707-D9CF-40AE-B4C6-C98DA3205C09}" type="datetimeFigureOut">
               <a:rPr lang="en-US" smtClean="0"/>
               <a:pPr/>
-              <a:t>3/8/2024</a:t>
+              <a:t>3/16/2024</a:t>
             </a:fld>
             <a:endParaRPr lang="en-US"/>
           </a:p>
@@ -2717,7 +2717,7 @@
             <a:fld id="{1D8BD707-D9CF-40AE-B4C6-C98DA3205C09}" type="datetimeFigureOut">
               <a:rPr lang="en-US" smtClean="0"/>
               <a:pPr/>
-              <a:t>3/8/2024</a:t>
+              <a:t>3/16/2024</a:t>
             </a:fld>
             <a:endParaRPr lang="en-US"/>
           </a:p>
@@ -3521,7 +3521,7 @@
               <a:alphaModFix amt="69000"/>
               <a:extLst>
                 <a:ext uri="{96DAC541-7B7A-43D3-8B79-37D633B846F1}">
-                  <asvg:svgBlip xmlns="" xmlns:asvg="http://schemas.microsoft.com/office/drawing/2016/SVG/main" r:embed="rId3"/>
+                  <asvg:svgBlip xmlns:asvg="http://schemas.microsoft.com/office/drawing/2016/SVG/main" xmlns="" r:embed="rId3"/>
                 </a:ext>
               </a:extLst>
             </a:blip>
@@ -9909,7 +9909,7 @@
         <p:spPr>
           <a:xfrm>
             <a:off x="816673" y="2247900"/>
-            <a:ext cx="16611599" cy="2246769"/>
+            <a:ext cx="16611599" cy="1169551"/>
           </a:xfrm>
           <a:prstGeom prst="rect">
             <a:avLst/>
@@ -9928,7 +9928,7 @@
                 <a:ea typeface="Lato" panose="020B0604020202020204" charset="0"/>
                 <a:cs typeface="Lato" panose="020B0604020202020204" charset="0"/>
               </a:rPr>
-              <a:t>O exemplo com o código-fonte </a:t>
+              <a:t>O exemplo com o código-fonte completo para a criação de um menu </a:t>
             </a:r>
             <a:r>
               <a:rPr lang="pt-BR" sz="3500" dirty="0" smtClean="0">
@@ -9936,52 +9936,17 @@
                 <a:ea typeface="Lato" panose="020B0604020202020204" charset="0"/>
                 <a:cs typeface="Lato" panose="020B0604020202020204" charset="0"/>
               </a:rPr>
-              <a:t>completo para a criação de um menu está disponível no seguinte link</a:t>
-            </a:r>
-            <a:r>
-              <a:rPr lang="pt-BR" sz="3500" dirty="0">
-                <a:latin typeface="Lato" panose="020B0604020202020204" charset="0"/>
-                <a:ea typeface="Lato" panose="020B0604020202020204" charset="0"/>
-                <a:cs typeface="Lato" panose="020B0604020202020204" charset="0"/>
-              </a:rPr>
-              <a:t>: </a:t>
-            </a:r>
-            <a:r>
-              <a:rPr lang="pt-BR" sz="3500" dirty="0" smtClean="0">
-                <a:latin typeface="Lato" panose="020B0604020202020204" charset="0"/>
-                <a:ea typeface="Lato" panose="020B0604020202020204" charset="0"/>
-                <a:cs typeface="Lato" panose="020B0604020202020204" charset="0"/>
-                <a:hlinkClick r:id="rId2"/>
-              </a:rPr>
-              <a:t>https</a:t>
-            </a:r>
-            <a:r>
-              <a:rPr lang="pt-BR" sz="3500" dirty="0">
-                <a:latin typeface="Lato" panose="020B0604020202020204" charset="0"/>
-                <a:ea typeface="Lato" panose="020B0604020202020204" charset="0"/>
-                <a:cs typeface="Lato" panose="020B0604020202020204" charset="0"/>
-                <a:hlinkClick r:id="rId2"/>
-              </a:rPr>
-              <a:t>://</a:t>
-            </a:r>
-            <a:r>
-              <a:rPr lang="pt-BR" sz="3500" dirty="0" smtClean="0">
-                <a:latin typeface="Lato" panose="020B0604020202020204" charset="0"/>
-                <a:ea typeface="Lato" panose="020B0604020202020204" charset="0"/>
-                <a:cs typeface="Lato" panose="020B0604020202020204" charset="0"/>
-                <a:hlinkClick r:id="rId2"/>
-              </a:rPr>
-              <a:t>github.com/marcosdosea/TreinamentoFlutter/blob/main/Aula08-Cria%C3%A7%C3%A3o%20de%20Menus/criacaoMenu.dart</a:t>
-            </a:r>
-            <a:r>
-              <a:rPr lang="pt-BR" sz="3500" dirty="0" smtClean="0">
-                <a:latin typeface="Lato" panose="020B0604020202020204" charset="0"/>
-                <a:ea typeface="Lato" panose="020B0604020202020204" charset="0"/>
-                <a:cs typeface="Lato" panose="020B0604020202020204" charset="0"/>
-              </a:rPr>
-              <a:t>.</a:t>
-            </a:r>
-            <a:endParaRPr lang="pt-BR" sz="3500" dirty="0">
+              <a:t>encontra-se no arquivo </a:t>
+            </a:r>
+            <a:r>
+              <a:rPr lang="pt-BR" sz="3500" b="1" dirty="0" err="1" smtClean="0">
+                <a:latin typeface="Lato" panose="020B0604020202020204" charset="0"/>
+                <a:ea typeface="Lato" panose="020B0604020202020204" charset="0"/>
+                <a:cs typeface="Lato" panose="020B0604020202020204" charset="0"/>
+              </a:rPr>
+              <a:t>criacaoMenu.dart</a:t>
+            </a:r>
+            <a:endParaRPr lang="pt-BR" sz="3500" b="1" dirty="0">
               <a:latin typeface="Lato" panose="020B0604020202020204" charset="0"/>
               <a:ea typeface="Lato" panose="020B0604020202020204" charset="0"/>
               <a:cs typeface="Lato" panose="020B0604020202020204" charset="0"/>

</xml_diff>